<commit_message>
Add more security volnerability and switching missing configurations
</commit_message>
<xml_diff>
--- a/161997-network-cable-template-16x9.pptx
+++ b/161997-network-cable-template-16x9.pptx
@@ -5,7 +5,7 @@
     <p:sldMasterId id="2147483648" r:id="rId1"/>
   </p:sldMasterIdLst>
   <p:notesMasterIdLst>
-    <p:notesMasterId r:id="rId9"/>
+    <p:notesMasterId r:id="rId11"/>
   </p:notesMasterIdLst>
   <p:sldIdLst>
     <p:sldId id="256" r:id="rId2"/>
@@ -15,6 +15,8 @@
     <p:sldId id="260" r:id="rId6"/>
     <p:sldId id="261" r:id="rId7"/>
     <p:sldId id="262" r:id="rId8"/>
+    <p:sldId id="264" r:id="rId9"/>
+    <p:sldId id="263" r:id="rId10"/>
   </p:sldIdLst>
   <p:sldSz cx="9144000" cy="5143500" type="screen16x9"/>
   <p:notesSz cx="6858000" cy="9144000"/>
@@ -4661,8 +4663,8 @@
         </p:nvSpPr>
         <p:spPr>
           <a:xfrm>
-            <a:off x="601670" y="1655520"/>
-            <a:ext cx="7711603" cy="2973891"/>
+            <a:off x="448965" y="1350110"/>
+            <a:ext cx="7711603" cy="4266553"/>
           </a:xfrm>
           <a:prstGeom prst="rect">
             <a:avLst/>
@@ -4715,9 +4717,29 @@
               </a:rPr>
               <a:t>របស់បណ្ដាញខាងលើរួចមក​ ឃើញថាមាននូវភាពទន់ខ្សោយជាច្រើនដូចជា៖</a:t>
             </a:r>
+            <a:endParaRPr lang="en-US" sz="1400" dirty="0">
+              <a:latin typeface="!Khmer OS Siemreap" panose="02000500000000020004" pitchFamily="2" charset="0"/>
+              <a:cs typeface="!Khmer OS Siemreap" panose="02000500000000020004" pitchFamily="2" charset="0"/>
+            </a:endParaRPr>
           </a:p>
           <a:p>
             <a:pPr marL="285750" indent="-285750">
+              <a:lnSpc>
+                <a:spcPct val="150000"/>
+              </a:lnSpc>
+              <a:buFont typeface="Wingdings" panose="05000000000000000000" pitchFamily="2" charset="2"/>
+              <a:buChar char="q"/>
+            </a:pPr>
+            <a:r>
+              <a:rPr lang="km-KH" sz="1400" dirty="0">
+                <a:latin typeface="!Khmer OS Siemreap" panose="02000500000000020004" pitchFamily="2" charset="0"/>
+                <a:cs typeface="!Khmer OS Siemreap" panose="02000500000000020004" pitchFamily="2" charset="0"/>
+              </a:rPr>
+              <a:t>ផ្នែកសន្តិសុខ</a:t>
+            </a:r>
+          </a:p>
+          <a:p>
+            <a:pPr marL="742950" lvl="1" indent="-285750">
               <a:lnSpc>
                 <a:spcPct val="150000"/>
               </a:lnSpc>
@@ -4725,71 +4747,64 @@
               <a:buChar char="Ø"/>
             </a:pPr>
             <a:r>
-              <a:rPr lang="km-KH" sz="1400" dirty="0">
-                <a:latin typeface="!Khmer OS Siemreap" panose="02000500000000020004" pitchFamily="2" charset="0"/>
-                <a:cs typeface="!Khmer OS Siemreap" panose="02000500000000020004" pitchFamily="2" charset="0"/>
-              </a:rPr>
-              <a:t>មិនមាន </a:t>
-            </a:r>
-            <a:r>
-              <a:rPr lang="en-US" sz="1400" dirty="0">
-                <a:latin typeface="!Khmer OS Siemreap" panose="02000500000000020004" pitchFamily="2" charset="0"/>
-                <a:cs typeface="!Khmer OS Siemreap" panose="02000500000000020004" pitchFamily="2" charset="0"/>
-              </a:rPr>
-              <a:t>Network Segmentation </a:t>
-            </a:r>
-            <a:r>
-              <a:rPr lang="km-KH" sz="1400" dirty="0">
-                <a:latin typeface="!Khmer OS Siemreap" panose="02000500000000020004" pitchFamily="2" charset="0"/>
-                <a:cs typeface="!Khmer OS Siemreap" panose="02000500000000020004" pitchFamily="2" charset="0"/>
-              </a:rPr>
-              <a:t>ពោលគឺអ្នកប្រើប្រាស់ទាំងអស់ស្ថិតក្នុង</a:t>
-            </a:r>
-            <a:r>
-              <a:rPr lang="en-US" sz="1400" dirty="0">
-                <a:latin typeface="!Khmer OS Siemreap" panose="02000500000000020004" pitchFamily="2" charset="0"/>
-                <a:cs typeface="!Khmer OS Siemreap" panose="02000500000000020004" pitchFamily="2" charset="0"/>
-              </a:rPr>
-              <a:t> Network </a:t>
-            </a:r>
-            <a:r>
-              <a:rPr lang="km-KH" sz="1400" dirty="0">
-                <a:latin typeface="!Khmer OS Siemreap" panose="02000500000000020004" pitchFamily="2" charset="0"/>
-                <a:cs typeface="!Khmer OS Siemreap" panose="02000500000000020004" pitchFamily="2" charset="0"/>
-              </a:rPr>
-              <a:t>តែមួយដែលជា </a:t>
-            </a:r>
-            <a:r>
-              <a:rPr lang="en-US" sz="1400" dirty="0">
-                <a:latin typeface="!Khmer OS Siemreap" panose="02000500000000020004" pitchFamily="2" charset="0"/>
-                <a:cs typeface="!Khmer OS Siemreap" panose="02000500000000020004" pitchFamily="2" charset="0"/>
-              </a:rPr>
-              <a:t>Single Broadcast Domain </a:t>
-            </a:r>
-            <a:r>
-              <a:rPr lang="km-KH" sz="1400" dirty="0">
-                <a:latin typeface="!Khmer OS Siemreap" panose="02000500000000020004" pitchFamily="2" charset="0"/>
-                <a:cs typeface="!Khmer OS Siemreap" panose="02000500000000020004" pitchFamily="2" charset="0"/>
-              </a:rPr>
-              <a:t>អាចនឹងទទួលផលវិបាកពី</a:t>
-            </a:r>
-            <a:r>
-              <a:rPr lang="en-US" sz="1400" dirty="0">
-                <a:latin typeface="!Khmer OS Siemreap" panose="02000500000000020004" pitchFamily="2" charset="0"/>
-                <a:cs typeface="!Khmer OS Siemreap" panose="02000500000000020004" pitchFamily="2" charset="0"/>
-              </a:rPr>
-              <a:t> Broadcast Storms </a:t>
-            </a:r>
-            <a:r>
-              <a:rPr lang="km-KH" sz="1400" dirty="0">
-                <a:latin typeface="!Khmer OS Siemreap" panose="02000500000000020004" pitchFamily="2" charset="0"/>
-                <a:cs typeface="!Khmer OS Siemreap" panose="02000500000000020004" pitchFamily="2" charset="0"/>
-              </a:rPr>
-              <a:t>និងការវាយប្រហារផ្នែកសន្តិសុខ។</a:t>
-            </a:r>
-          </a:p>
-          <a:p>
-            <a:pPr marL="285750" indent="-285750">
+              <a:rPr lang="en-US" sz="1400" dirty="0">
+                <a:latin typeface="!Khmer OS Siemreap" panose="02000500000000020004" pitchFamily="2" charset="0"/>
+                <a:cs typeface="!Khmer OS Siemreap" panose="02000500000000020004" pitchFamily="2" charset="0"/>
+              </a:rPr>
+              <a:t>Switch</a:t>
+            </a:r>
+            <a:r>
+              <a:rPr lang="km-KH" sz="1400" dirty="0">
+                <a:latin typeface="!Khmer OS Siemreap" panose="02000500000000020004" pitchFamily="2" charset="0"/>
+                <a:cs typeface="!Khmer OS Siemreap" panose="02000500000000020004" pitchFamily="2" charset="0"/>
+              </a:rPr>
+              <a:t> និង </a:t>
+            </a:r>
+            <a:r>
+              <a:rPr lang="en-US" sz="1400" dirty="0">
+                <a:latin typeface="!Khmer OS Siemreap" panose="02000500000000020004" pitchFamily="2" charset="0"/>
+                <a:cs typeface="!Khmer OS Siemreap" panose="02000500000000020004" pitchFamily="2" charset="0"/>
+              </a:rPr>
+              <a:t>Router </a:t>
+            </a:r>
+            <a:r>
+              <a:rPr lang="km-KH" sz="1400" dirty="0">
+                <a:latin typeface="!Khmer OS Siemreap" panose="02000500000000020004" pitchFamily="2" charset="0"/>
+                <a:cs typeface="!Khmer OS Siemreap" panose="02000500000000020004" pitchFamily="2" charset="0"/>
+              </a:rPr>
+              <a:t>ប្រើប្រាស់</a:t>
+            </a:r>
+            <a:r>
+              <a:rPr lang="en-US" sz="1400" dirty="0">
+                <a:latin typeface="!Khmer OS Siemreap" panose="02000500000000020004" pitchFamily="2" charset="0"/>
+                <a:cs typeface="!Khmer OS Siemreap" panose="02000500000000020004" pitchFamily="2" charset="0"/>
+              </a:rPr>
+              <a:t> Protocol Telnet </a:t>
+            </a:r>
+            <a:r>
+              <a:rPr lang="km-KH" sz="1400" dirty="0">
+                <a:latin typeface="!Khmer OS Siemreap" panose="02000500000000020004" pitchFamily="2" charset="0"/>
+                <a:cs typeface="!Khmer OS Siemreap" panose="02000500000000020004" pitchFamily="2" charset="0"/>
+              </a:rPr>
+              <a:t>ដើម្បីធ្វើ</a:t>
+            </a:r>
+            <a:r>
+              <a:rPr lang="en-US" sz="1400" dirty="0">
+                <a:latin typeface="!Khmer OS Siemreap" panose="02000500000000020004" pitchFamily="2" charset="0"/>
+                <a:cs typeface="!Khmer OS Siemreap" panose="02000500000000020004" pitchFamily="2" charset="0"/>
+              </a:rPr>
+              <a:t> Management Remote Access </a:t>
+            </a:r>
+            <a:r>
+              <a:rPr lang="km-KH" sz="1400" dirty="0">
+                <a:latin typeface="!Khmer OS Siemreap" panose="02000500000000020004" pitchFamily="2" charset="0"/>
+                <a:cs typeface="!Khmer OS Siemreap" panose="02000500000000020004" pitchFamily="2" charset="0"/>
+              </a:rPr>
+              <a:t>ដែលមិនមានសុវត្ថិភាព</a:t>
+            </a:r>
+          </a:p>
+          <a:p>
+            <a:pPr marL="742950" lvl="1" indent="-285750">
               <a:lnSpc>
                 <a:spcPct val="150000"/>
               </a:lnSpc>
@@ -4797,6 +4812,78 @@
               <a:buChar char="Ø"/>
             </a:pPr>
             <a:r>
+              <a:rPr lang="km-KH" sz="1400" dirty="0">
+                <a:latin typeface="!Khmer OS Siemreap" panose="02000500000000020004" pitchFamily="2" charset="0"/>
+                <a:cs typeface="!Khmer OS Siemreap" panose="02000500000000020004" pitchFamily="2" charset="0"/>
+              </a:rPr>
+              <a:t>មិនមាន </a:t>
+            </a:r>
+            <a:r>
+              <a:rPr lang="en-US" sz="1400" dirty="0">
+                <a:latin typeface="!Khmer OS Siemreap" panose="02000500000000020004" pitchFamily="2" charset="0"/>
+                <a:cs typeface="!Khmer OS Siemreap" panose="02000500000000020004" pitchFamily="2" charset="0"/>
+              </a:rPr>
+              <a:t>Network Segmentation (VLAN) </a:t>
+            </a:r>
+            <a:r>
+              <a:rPr lang="km-KH" sz="1400" dirty="0">
+                <a:latin typeface="!Khmer OS Siemreap" panose="02000500000000020004" pitchFamily="2" charset="0"/>
+                <a:cs typeface="!Khmer OS Siemreap" panose="02000500000000020004" pitchFamily="2" charset="0"/>
+              </a:rPr>
+              <a:t>ពោលគឺអ្នកប្រើប្រាស់ទាំងអស់ស្ថិតក្នុង</a:t>
+            </a:r>
+            <a:r>
+              <a:rPr lang="en-US" sz="1400" dirty="0">
+                <a:latin typeface="!Khmer OS Siemreap" panose="02000500000000020004" pitchFamily="2" charset="0"/>
+                <a:cs typeface="!Khmer OS Siemreap" panose="02000500000000020004" pitchFamily="2" charset="0"/>
+              </a:rPr>
+              <a:t> Network </a:t>
+            </a:r>
+            <a:r>
+              <a:rPr lang="km-KH" sz="1400" dirty="0">
+                <a:latin typeface="!Khmer OS Siemreap" panose="02000500000000020004" pitchFamily="2" charset="0"/>
+                <a:cs typeface="!Khmer OS Siemreap" panose="02000500000000020004" pitchFamily="2" charset="0"/>
+              </a:rPr>
+              <a:t>តែមួយដែលជា </a:t>
+            </a:r>
+            <a:r>
+              <a:rPr lang="en-US" sz="1400" dirty="0">
+                <a:latin typeface="!Khmer OS Siemreap" panose="02000500000000020004" pitchFamily="2" charset="0"/>
+                <a:cs typeface="!Khmer OS Siemreap" panose="02000500000000020004" pitchFamily="2" charset="0"/>
+              </a:rPr>
+              <a:t>Single Broadcast Domain </a:t>
+            </a:r>
+            <a:r>
+              <a:rPr lang="km-KH" sz="1400" dirty="0">
+                <a:latin typeface="!Khmer OS Siemreap" panose="02000500000000020004" pitchFamily="2" charset="0"/>
+                <a:cs typeface="!Khmer OS Siemreap" panose="02000500000000020004" pitchFamily="2" charset="0"/>
+              </a:rPr>
+              <a:t>អាចនឹងទទួលផលវិបាកពី</a:t>
+            </a:r>
+            <a:r>
+              <a:rPr lang="en-US" sz="1400" dirty="0">
+                <a:latin typeface="!Khmer OS Siemreap" panose="02000500000000020004" pitchFamily="2" charset="0"/>
+                <a:cs typeface="!Khmer OS Siemreap" panose="02000500000000020004" pitchFamily="2" charset="0"/>
+              </a:rPr>
+              <a:t> Broadcast Storms </a:t>
+            </a:r>
+            <a:r>
+              <a:rPr lang="km-KH" sz="1400" dirty="0">
+                <a:latin typeface="!Khmer OS Siemreap" panose="02000500000000020004" pitchFamily="2" charset="0"/>
+                <a:cs typeface="!Khmer OS Siemreap" panose="02000500000000020004" pitchFamily="2" charset="0"/>
+              </a:rPr>
+              <a:t>និងការវាយប្រហារផ្នែកសន្តិសុខ។</a:t>
+            </a:r>
+          </a:p>
+          <a:p>
+            <a:pPr marL="742950" lvl="1" indent="-285750">
+              <a:lnSpc>
+                <a:spcPct val="150000"/>
+              </a:lnSpc>
+              <a:buFont typeface="Wingdings" panose="05000000000000000000" pitchFamily="2" charset="2"/>
+              <a:buChar char="Ø"/>
+            </a:pPr>
+            <a:r>
               <a:rPr lang="en-US" sz="1400" dirty="0">
                 <a:latin typeface="!Khmer OS Siemreap" panose="02000500000000020004" pitchFamily="2" charset="0"/>
                 <a:cs typeface="!Khmer OS Siemreap" panose="02000500000000020004" pitchFamily="2" charset="0"/>
@@ -4850,7 +4937,21 @@
                 <a:latin typeface="!Khmer OS Siemreap" panose="02000500000000020004" pitchFamily="2" charset="0"/>
                 <a:cs typeface="!Khmer OS Siemreap" panose="02000500000000020004" pitchFamily="2" charset="0"/>
               </a:rPr>
-              <a:t>ដែលអ្នកប្រើប្រាស់មានបំណងអាក្រក់អាចប្រើប្រាស់ </a:t>
+              <a:t>ដែល</a:t>
+            </a:r>
+            <a:r>
+              <a:rPr lang="en-US" sz="1400" dirty="0">
+                <a:latin typeface="!Khmer OS Siemreap" panose="02000500000000020004" pitchFamily="2" charset="0"/>
+                <a:cs typeface="!Khmer OS Siemreap" panose="02000500000000020004" pitchFamily="2" charset="0"/>
+              </a:rPr>
+              <a:t> Attacker </a:t>
+            </a:r>
+            <a:r>
+              <a:rPr lang="km-KH" sz="1400" dirty="0">
+                <a:latin typeface="!Khmer OS Siemreap" panose="02000500000000020004" pitchFamily="2" charset="0"/>
+                <a:cs typeface="!Khmer OS Siemreap" panose="02000500000000020004" pitchFamily="2" charset="0"/>
+              </a:rPr>
+              <a:t>អាចប្រើប្រាស់ </a:t>
             </a:r>
             <a:r>
               <a:rPr lang="en-US" sz="1400" dirty="0">
@@ -4969,7 +5070,21 @@
                 <a:latin typeface="!Khmer OS Siemreap" panose="02000500000000020004" pitchFamily="2" charset="0"/>
                 <a:cs typeface="!Khmer OS Siemreap" panose="02000500000000020004" pitchFamily="2" charset="0"/>
               </a:rPr>
-              <a:t>ទាំងឡាយដែលពេលនោះអ្នកដែលមានបំណងអាក្រក់អាចទទួលបាន</a:t>
+              <a:t>ទាំងឡាយដែលពេលនោះ</a:t>
+            </a:r>
+            <a:r>
+              <a:rPr lang="en-US" sz="1400" dirty="0">
+                <a:latin typeface="!Khmer OS Siemreap" panose="02000500000000020004" pitchFamily="2" charset="0"/>
+                <a:cs typeface="!Khmer OS Siemreap" panose="02000500000000020004" pitchFamily="2" charset="0"/>
+              </a:rPr>
+              <a:t> Attacker </a:t>
+            </a:r>
+            <a:r>
+              <a:rPr lang="km-KH" sz="1400" dirty="0">
+                <a:latin typeface="!Khmer OS Siemreap" panose="02000500000000020004" pitchFamily="2" charset="0"/>
+                <a:cs typeface="!Khmer OS Siemreap" panose="02000500000000020004" pitchFamily="2" charset="0"/>
+              </a:rPr>
+              <a:t>អាចទទួលបាន</a:t>
             </a:r>
             <a:r>
               <a:rPr lang="en-US" sz="1400" dirty="0">
@@ -5033,7 +5148,7 @@
         <p:spPr>
           <a:xfrm>
             <a:off x="1059785" y="1808225"/>
-            <a:ext cx="6413610" cy="1681229"/>
+            <a:ext cx="6413610" cy="3297056"/>
           </a:xfrm>
           <a:prstGeom prst="rect">
             <a:avLst/>
@@ -5045,6 +5160,441 @@
             <a:spAutoFit/>
           </a:bodyPr>
           <a:lstStyle/>
+          <a:p>
+            <a:pPr marL="742950" lvl="1" indent="-285750">
+              <a:lnSpc>
+                <a:spcPct val="150000"/>
+              </a:lnSpc>
+              <a:buFont typeface="Wingdings" panose="05000000000000000000" pitchFamily="2" charset="2"/>
+              <a:buChar char="Ø"/>
+            </a:pPr>
+            <a:r>
+              <a:rPr lang="en-US" sz="1400" dirty="0">
+                <a:latin typeface="!Khmer OS Siemreap" panose="02000500000000020004" pitchFamily="2" charset="0"/>
+                <a:cs typeface="!Khmer OS Siemreap" panose="02000500000000020004" pitchFamily="2" charset="0"/>
+              </a:rPr>
+              <a:t>Ports </a:t>
+            </a:r>
+            <a:r>
+              <a:rPr lang="km-KH" sz="1400" dirty="0">
+                <a:latin typeface="!Khmer OS Siemreap" panose="02000500000000020004" pitchFamily="2" charset="0"/>
+                <a:cs typeface="!Khmer OS Siemreap" panose="02000500000000020004" pitchFamily="2" charset="0"/>
+              </a:rPr>
+              <a:t>របស់ </a:t>
+            </a:r>
+            <a:r>
+              <a:rPr lang="en-US" sz="1400" dirty="0">
+                <a:latin typeface="!Khmer OS Siemreap" panose="02000500000000020004" pitchFamily="2" charset="0"/>
+                <a:cs typeface="!Khmer OS Siemreap" panose="02000500000000020004" pitchFamily="2" charset="0"/>
+              </a:rPr>
+              <a:t>Switch </a:t>
+            </a:r>
+            <a:r>
+              <a:rPr lang="km-KH" sz="1400" dirty="0">
+                <a:latin typeface="!Khmer OS Siemreap" panose="02000500000000020004" pitchFamily="2" charset="0"/>
+                <a:cs typeface="!Khmer OS Siemreap" panose="02000500000000020004" pitchFamily="2" charset="0"/>
+              </a:rPr>
+              <a:t>ដែលមិនបានប្រើប្រាស់មិនត្រូវបានបិទ</a:t>
+            </a:r>
+            <a:r>
+              <a:rPr lang="en-US" sz="1400" dirty="0">
+                <a:latin typeface="!Khmer OS Siemreap" panose="02000500000000020004" pitchFamily="2" charset="0"/>
+                <a:cs typeface="!Khmer OS Siemreap" panose="02000500000000020004" pitchFamily="2" charset="0"/>
+              </a:rPr>
+              <a:t> (Shutdown)</a:t>
+            </a:r>
+            <a:r>
+              <a:rPr lang="km-KH" sz="1400" dirty="0">
+                <a:latin typeface="!Khmer OS Siemreap" panose="02000500000000020004" pitchFamily="2" charset="0"/>
+                <a:cs typeface="!Khmer OS Siemreap" panose="02000500000000020004" pitchFamily="2" charset="0"/>
+              </a:rPr>
+              <a:t>​ និងស្ថិតនៅ</a:t>
+            </a:r>
+            <a:r>
+              <a:rPr lang="en-US" sz="1400" dirty="0">
+                <a:latin typeface="!Khmer OS Siemreap" panose="02000500000000020004" pitchFamily="2" charset="0"/>
+                <a:cs typeface="!Khmer OS Siemreap" panose="02000500000000020004" pitchFamily="2" charset="0"/>
+              </a:rPr>
+              <a:t> mode </a:t>
+            </a:r>
+            <a:r>
+              <a:rPr lang="km-KH" sz="1400" dirty="0">
+                <a:latin typeface="!Khmer OS Siemreap" panose="02000500000000020004" pitchFamily="2" charset="0"/>
+                <a:cs typeface="!Khmer OS Siemreap" panose="02000500000000020004" pitchFamily="2" charset="0"/>
+              </a:rPr>
+              <a:t>(</a:t>
+            </a:r>
+            <a:r>
+              <a:rPr lang="en-US" sz="1400" dirty="0">
+                <a:latin typeface="!Khmer OS Siemreap" panose="02000500000000020004" pitchFamily="2" charset="0"/>
+                <a:cs typeface="!Khmer OS Siemreap" panose="02000500000000020004" pitchFamily="2" charset="0"/>
+              </a:rPr>
+              <a:t>Dynamic Auto</a:t>
+            </a:r>
+            <a:r>
+              <a:rPr lang="km-KH" sz="1400" dirty="0">
+                <a:latin typeface="!Khmer OS Siemreap" panose="02000500000000020004" pitchFamily="2" charset="0"/>
+                <a:cs typeface="!Khmer OS Siemreap" panose="02000500000000020004" pitchFamily="2" charset="0"/>
+              </a:rPr>
+              <a:t>)</a:t>
+            </a:r>
+            <a:r>
+              <a:rPr lang="en-US" sz="1400" dirty="0">
+                <a:latin typeface="!Khmer OS Siemreap" panose="02000500000000020004" pitchFamily="2" charset="0"/>
+                <a:cs typeface="!Khmer OS Siemreap" panose="02000500000000020004" pitchFamily="2" charset="0"/>
+              </a:rPr>
+              <a:t> </a:t>
+            </a:r>
+            <a:r>
+              <a:rPr lang="km-KH" sz="1400" dirty="0">
+                <a:latin typeface="!Khmer OS Siemreap" panose="02000500000000020004" pitchFamily="2" charset="0"/>
+                <a:cs typeface="!Khmer OS Siemreap" panose="02000500000000020004" pitchFamily="2" charset="0"/>
+              </a:rPr>
+              <a:t>ដែលធ្វើអោយប្រឈមនឹង</a:t>
+            </a:r>
+            <a:r>
+              <a:rPr lang="en-US" sz="1400" dirty="0">
+                <a:latin typeface="!Khmer OS Siemreap" panose="02000500000000020004" pitchFamily="2" charset="0"/>
+                <a:cs typeface="!Khmer OS Siemreap" panose="02000500000000020004" pitchFamily="2" charset="0"/>
+              </a:rPr>
+              <a:t> VLAN Hopping </a:t>
+            </a:r>
+            <a:r>
+              <a:rPr lang="km-KH" sz="1400" dirty="0">
+                <a:latin typeface="!Khmer OS Siemreap" panose="02000500000000020004" pitchFamily="2" charset="0"/>
+                <a:cs typeface="!Khmer OS Siemreap" panose="02000500000000020004" pitchFamily="2" charset="0"/>
+              </a:rPr>
+              <a:t>ដែល</a:t>
+            </a:r>
+            <a:r>
+              <a:rPr lang="en-US" sz="1400" dirty="0">
+                <a:latin typeface="!Khmer OS Siemreap" panose="02000500000000020004" pitchFamily="2" charset="0"/>
+                <a:cs typeface="!Khmer OS Siemreap" panose="02000500000000020004" pitchFamily="2" charset="0"/>
+              </a:rPr>
+              <a:t> Attacker </a:t>
+            </a:r>
+            <a:r>
+              <a:rPr lang="km-KH" sz="1400" dirty="0">
+                <a:latin typeface="!Khmer OS Siemreap" panose="02000500000000020004" pitchFamily="2" charset="0"/>
+                <a:cs typeface="!Khmer OS Siemreap" panose="02000500000000020004" pitchFamily="2" charset="0"/>
+              </a:rPr>
+              <a:t>អាចក្លែងបន្លំ</a:t>
+            </a:r>
+            <a:r>
+              <a:rPr lang="en-US" sz="1400" dirty="0">
+                <a:latin typeface="!Khmer OS Siemreap" panose="02000500000000020004" pitchFamily="2" charset="0"/>
+                <a:cs typeface="!Khmer OS Siemreap" panose="02000500000000020004" pitchFamily="2" charset="0"/>
+              </a:rPr>
+              <a:t> Device </a:t>
+            </a:r>
+            <a:r>
+              <a:rPr lang="km-KH" sz="1400" dirty="0">
+                <a:latin typeface="!Khmer OS Siemreap" panose="02000500000000020004" pitchFamily="2" charset="0"/>
+                <a:cs typeface="!Khmer OS Siemreap" panose="02000500000000020004" pitchFamily="2" charset="0"/>
+              </a:rPr>
+              <a:t>របស់ខ្លួនជា </a:t>
+            </a:r>
+            <a:r>
+              <a:rPr lang="en-US" sz="1400" dirty="0">
+                <a:latin typeface="!Khmer OS Siemreap" panose="02000500000000020004" pitchFamily="2" charset="0"/>
+                <a:cs typeface="!Khmer OS Siemreap" panose="02000500000000020004" pitchFamily="2" charset="0"/>
+              </a:rPr>
+              <a:t>Switch </a:t>
+            </a:r>
+            <a:r>
+              <a:rPr lang="km-KH" sz="1400" dirty="0">
+                <a:latin typeface="!Khmer OS Siemreap" panose="02000500000000020004" pitchFamily="2" charset="0"/>
+                <a:cs typeface="!Khmer OS Siemreap" panose="02000500000000020004" pitchFamily="2" charset="0"/>
+              </a:rPr>
+              <a:t>និង​ធ្វើ </a:t>
+            </a:r>
+            <a:r>
+              <a:rPr lang="en-US" sz="1400" dirty="0">
+                <a:latin typeface="!Khmer OS Siemreap" panose="02000500000000020004" pitchFamily="2" charset="0"/>
+                <a:cs typeface="!Khmer OS Siemreap" panose="02000500000000020004" pitchFamily="2" charset="0"/>
+              </a:rPr>
+              <a:t>Negotiation </a:t>
+            </a:r>
+            <a:r>
+              <a:rPr lang="km-KH" sz="1400" dirty="0">
+                <a:latin typeface="!Khmer OS Siemreap" panose="02000500000000020004" pitchFamily="2" charset="0"/>
+                <a:cs typeface="!Khmer OS Siemreap" panose="02000500000000020004" pitchFamily="2" charset="0"/>
+              </a:rPr>
+              <a:t>ដើម្បីបង្កើត </a:t>
+            </a:r>
+            <a:r>
+              <a:rPr lang="en-US" sz="1400" dirty="0">
+                <a:latin typeface="!Khmer OS Siemreap" panose="02000500000000020004" pitchFamily="2" charset="0"/>
+                <a:cs typeface="!Khmer OS Siemreap" panose="02000500000000020004" pitchFamily="2" charset="0"/>
+              </a:rPr>
+              <a:t>Trunk Link</a:t>
+            </a:r>
+            <a:r>
+              <a:rPr lang="km-KH" sz="1400" dirty="0">
+                <a:latin typeface="!Khmer OS Siemreap" panose="02000500000000020004" pitchFamily="2" charset="0"/>
+                <a:cs typeface="!Khmer OS Siemreap" panose="02000500000000020004" pitchFamily="2" charset="0"/>
+              </a:rPr>
+              <a:t>។ ពេលនោះ</a:t>
+            </a:r>
+            <a:r>
+              <a:rPr lang="en-US" sz="1400" dirty="0">
+                <a:latin typeface="!Khmer OS Siemreap" panose="02000500000000020004" pitchFamily="2" charset="0"/>
+                <a:cs typeface="!Khmer OS Siemreap" panose="02000500000000020004" pitchFamily="2" charset="0"/>
+              </a:rPr>
+              <a:t> Device </a:t>
+            </a:r>
+            <a:r>
+              <a:rPr lang="km-KH" sz="1400" dirty="0">
+                <a:latin typeface="!Khmer OS Siemreap" panose="02000500000000020004" pitchFamily="2" charset="0"/>
+                <a:cs typeface="!Khmer OS Siemreap" panose="02000500000000020004" pitchFamily="2" charset="0"/>
+              </a:rPr>
+              <a:t>របស់</a:t>
+            </a:r>
+            <a:r>
+              <a:rPr lang="en-US" sz="1400" dirty="0">
+                <a:latin typeface="!Khmer OS Siemreap" panose="02000500000000020004" pitchFamily="2" charset="0"/>
+                <a:cs typeface="!Khmer OS Siemreap" panose="02000500000000020004" pitchFamily="2" charset="0"/>
+              </a:rPr>
+              <a:t> Attacker </a:t>
+            </a:r>
+            <a:r>
+              <a:rPr lang="km-KH" sz="1400" dirty="0">
+                <a:latin typeface="!Khmer OS Siemreap" panose="02000500000000020004" pitchFamily="2" charset="0"/>
+                <a:cs typeface="!Khmer OS Siemreap" panose="02000500000000020004" pitchFamily="2" charset="0"/>
+              </a:rPr>
+              <a:t>អាច </a:t>
+            </a:r>
+            <a:r>
+              <a:rPr lang="en-US" sz="1400" dirty="0">
+                <a:latin typeface="!Khmer OS Siemreap" panose="02000500000000020004" pitchFamily="2" charset="0"/>
+                <a:cs typeface="!Khmer OS Siemreap" panose="02000500000000020004" pitchFamily="2" charset="0"/>
+              </a:rPr>
+              <a:t>Access </a:t>
+            </a:r>
+            <a:r>
+              <a:rPr lang="km-KH" sz="1400" dirty="0">
+                <a:latin typeface="!Khmer OS Siemreap" panose="02000500000000020004" pitchFamily="2" charset="0"/>
+                <a:cs typeface="!Khmer OS Siemreap" panose="02000500000000020004" pitchFamily="2" charset="0"/>
+              </a:rPr>
+              <a:t>ទៅគ្រប់ </a:t>
+            </a:r>
+            <a:r>
+              <a:rPr lang="en-US" sz="1400" dirty="0">
+                <a:latin typeface="!Khmer OS Siemreap" panose="02000500000000020004" pitchFamily="2" charset="0"/>
+                <a:cs typeface="!Khmer OS Siemreap" panose="02000500000000020004" pitchFamily="2" charset="0"/>
+              </a:rPr>
+              <a:t>Devices </a:t>
+            </a:r>
+            <a:r>
+              <a:rPr lang="km-KH" sz="1400" dirty="0">
+                <a:latin typeface="!Khmer OS Siemreap" panose="02000500000000020004" pitchFamily="2" charset="0"/>
+                <a:cs typeface="!Khmer OS Siemreap" panose="02000500000000020004" pitchFamily="2" charset="0"/>
+              </a:rPr>
+              <a:t>ផ្សេងទៀតទោះស្ថិតក្នុង</a:t>
+            </a:r>
+            <a:r>
+              <a:rPr lang="en-US" sz="1400" dirty="0">
+                <a:latin typeface="!Khmer OS Siemreap" panose="02000500000000020004" pitchFamily="2" charset="0"/>
+                <a:cs typeface="!Khmer OS Siemreap" panose="02000500000000020004" pitchFamily="2" charset="0"/>
+              </a:rPr>
+              <a:t> VLAN </a:t>
+            </a:r>
+            <a:r>
+              <a:rPr lang="km-KH" sz="1400" dirty="0">
+                <a:latin typeface="!Khmer OS Siemreap" panose="02000500000000020004" pitchFamily="2" charset="0"/>
+                <a:cs typeface="!Khmer OS Siemreap" panose="02000500000000020004" pitchFamily="2" charset="0"/>
+              </a:rPr>
+              <a:t>ផ្សេងក៏ដោយ។</a:t>
+            </a:r>
+            <a:r>
+              <a:rPr lang="en-US" sz="1400" dirty="0">
+                <a:latin typeface="!Khmer OS Siemreap" panose="02000500000000020004" pitchFamily="2" charset="0"/>
+                <a:cs typeface="!Khmer OS Siemreap" panose="02000500000000020004" pitchFamily="2" charset="0"/>
+              </a:rPr>
+              <a:t> </a:t>
+            </a:r>
+          </a:p>
+          <a:p>
+            <a:pPr marL="742950" lvl="1" indent="-285750">
+              <a:lnSpc>
+                <a:spcPct val="150000"/>
+              </a:lnSpc>
+              <a:buFont typeface="Wingdings" panose="05000000000000000000" pitchFamily="2" charset="2"/>
+              <a:buChar char="Ø"/>
+            </a:pPr>
+            <a:r>
+              <a:rPr lang="en-US" sz="1400" dirty="0">
+                <a:latin typeface="!Khmer OS Siemreap" panose="02000500000000020004" pitchFamily="2" charset="0"/>
+                <a:cs typeface="!Khmer OS Siemreap" panose="02000500000000020004" pitchFamily="2" charset="0"/>
+              </a:rPr>
+              <a:t>Switch </a:t>
+            </a:r>
+            <a:r>
+              <a:rPr lang="km-KH" sz="1400" dirty="0">
+                <a:latin typeface="!Khmer OS Siemreap" panose="02000500000000020004" pitchFamily="2" charset="0"/>
+                <a:cs typeface="!Khmer OS Siemreap" panose="02000500000000020004" pitchFamily="2" charset="0"/>
+              </a:rPr>
+              <a:t>មិនមាន</a:t>
+            </a:r>
+            <a:r>
+              <a:rPr lang="en-US" sz="1400" dirty="0">
+                <a:latin typeface="!Khmer OS Siemreap" panose="02000500000000020004" pitchFamily="2" charset="0"/>
+                <a:cs typeface="!Khmer OS Siemreap" panose="02000500000000020004" pitchFamily="2" charset="0"/>
+              </a:rPr>
+              <a:t> Configuration </a:t>
+            </a:r>
+            <a:r>
+              <a:rPr lang="km-KH" sz="1400" dirty="0">
+                <a:latin typeface="!Khmer OS Siemreap" panose="02000500000000020004" pitchFamily="2" charset="0"/>
+                <a:cs typeface="!Khmer OS Siemreap" panose="02000500000000020004" pitchFamily="2" charset="0"/>
+              </a:rPr>
+              <a:t>ទាក់ទងនឹង </a:t>
+            </a:r>
+            <a:r>
+              <a:rPr lang="en-US" sz="1400" dirty="0">
+                <a:latin typeface="!Khmer OS Siemreap" panose="02000500000000020004" pitchFamily="2" charset="0"/>
+                <a:cs typeface="!Khmer OS Siemreap" panose="02000500000000020004" pitchFamily="2" charset="0"/>
+              </a:rPr>
+              <a:t>DAI </a:t>
+            </a:r>
+            <a:r>
+              <a:rPr lang="km-KH" sz="1400" dirty="0">
+                <a:latin typeface="!Khmer OS Siemreap" panose="02000500000000020004" pitchFamily="2" charset="0"/>
+                <a:cs typeface="!Khmer OS Siemreap" panose="02000500000000020004" pitchFamily="2" charset="0"/>
+              </a:rPr>
+              <a:t>ដែលអាចអោយ</a:t>
+            </a:r>
+            <a:r>
+              <a:rPr lang="en-US" sz="1400" dirty="0">
+                <a:latin typeface="!Khmer OS Siemreap" panose="02000500000000020004" pitchFamily="2" charset="0"/>
+                <a:cs typeface="!Khmer OS Siemreap" panose="02000500000000020004" pitchFamily="2" charset="0"/>
+              </a:rPr>
+              <a:t> Attacker </a:t>
+            </a:r>
+            <a:r>
+              <a:rPr lang="km-KH" sz="1400" dirty="0">
+                <a:latin typeface="!Khmer OS Siemreap" panose="02000500000000020004" pitchFamily="2" charset="0"/>
+                <a:cs typeface="!Khmer OS Siemreap" panose="02000500000000020004" pitchFamily="2" charset="0"/>
+              </a:rPr>
+              <a:t>អាចផ្ញើ </a:t>
+            </a:r>
+            <a:r>
+              <a:rPr lang="en-US" sz="1400" dirty="0">
+                <a:latin typeface="!Khmer OS Siemreap" panose="02000500000000020004" pitchFamily="2" charset="0"/>
+                <a:cs typeface="!Khmer OS Siemreap" panose="02000500000000020004" pitchFamily="2" charset="0"/>
+              </a:rPr>
+              <a:t>Gratuitous ARP Replies</a:t>
+            </a:r>
+            <a:r>
+              <a:rPr lang="km-KH" sz="1400" dirty="0">
+                <a:latin typeface="!Khmer OS Siemreap" panose="02000500000000020004" pitchFamily="2" charset="0"/>
+                <a:cs typeface="!Khmer OS Siemreap" panose="02000500000000020004" pitchFamily="2" charset="0"/>
+              </a:rPr>
+              <a:t>​ ដោយបន្លំយក</a:t>
+            </a:r>
+            <a:r>
+              <a:rPr lang="en-US" sz="1400" dirty="0">
+                <a:latin typeface="!Khmer OS Siemreap" panose="02000500000000020004" pitchFamily="2" charset="0"/>
+                <a:cs typeface="!Khmer OS Siemreap" panose="02000500000000020004" pitchFamily="2" charset="0"/>
+              </a:rPr>
+              <a:t> IP Address </a:t>
+            </a:r>
+            <a:r>
+              <a:rPr lang="km-KH" sz="1400" dirty="0">
+                <a:latin typeface="!Khmer OS Siemreap" panose="02000500000000020004" pitchFamily="2" charset="0"/>
+                <a:cs typeface="!Khmer OS Siemreap" panose="02000500000000020004" pitchFamily="2" charset="0"/>
+              </a:rPr>
+              <a:t>របស់ </a:t>
+            </a:r>
+            <a:r>
+              <a:rPr lang="en-US" sz="1400" dirty="0">
+                <a:latin typeface="!Khmer OS Siemreap" panose="02000500000000020004" pitchFamily="2" charset="0"/>
+                <a:cs typeface="!Khmer OS Siemreap" panose="02000500000000020004" pitchFamily="2" charset="0"/>
+              </a:rPr>
+              <a:t>Default Gateway</a:t>
+            </a:r>
+            <a:r>
+              <a:rPr lang="km-KH" sz="1400" dirty="0">
+                <a:latin typeface="!Khmer OS Siemreap" panose="02000500000000020004" pitchFamily="2" charset="0"/>
+                <a:cs typeface="!Khmer OS Siemreap" panose="02000500000000020004" pitchFamily="2" charset="0"/>
+              </a:rPr>
+              <a:t> មាន</a:t>
+            </a:r>
+            <a:r>
+              <a:rPr lang="en-US" sz="1400" dirty="0">
+                <a:latin typeface="!Khmer OS Siemreap" panose="02000500000000020004" pitchFamily="2" charset="0"/>
+                <a:cs typeface="!Khmer OS Siemreap" panose="02000500000000020004" pitchFamily="2" charset="0"/>
+              </a:rPr>
+              <a:t> MAC Address </a:t>
+            </a:r>
+            <a:r>
+              <a:rPr lang="km-KH" sz="1400" dirty="0">
+                <a:latin typeface="!Khmer OS Siemreap" panose="02000500000000020004" pitchFamily="2" charset="0"/>
+                <a:cs typeface="!Khmer OS Siemreap" panose="02000500000000020004" pitchFamily="2" charset="0"/>
+              </a:rPr>
+              <a:t>ដែលជារបស់ </a:t>
+            </a:r>
+            <a:r>
+              <a:rPr lang="en-US" sz="1400" dirty="0">
+                <a:latin typeface="!Khmer OS Siemreap" panose="02000500000000020004" pitchFamily="2" charset="0"/>
+                <a:cs typeface="!Khmer OS Siemreap" panose="02000500000000020004" pitchFamily="2" charset="0"/>
+              </a:rPr>
+              <a:t>Attacker </a:t>
+            </a:r>
+            <a:r>
+              <a:rPr lang="km-KH" sz="1400" dirty="0">
+                <a:latin typeface="!Khmer OS Siemreap" panose="02000500000000020004" pitchFamily="2" charset="0"/>
+                <a:cs typeface="!Khmer OS Siemreap" panose="02000500000000020004" pitchFamily="2" charset="0"/>
+              </a:rPr>
+              <a:t>ទៅអោយគ្រប់</a:t>
+            </a:r>
+            <a:r>
+              <a:rPr lang="en-US" sz="1400" dirty="0">
+                <a:latin typeface="!Khmer OS Siemreap" panose="02000500000000020004" pitchFamily="2" charset="0"/>
+                <a:cs typeface="!Khmer OS Siemreap" panose="02000500000000020004" pitchFamily="2" charset="0"/>
+              </a:rPr>
+              <a:t> Devices </a:t>
+            </a:r>
+            <a:r>
+              <a:rPr lang="km-KH" sz="1400" dirty="0">
+                <a:latin typeface="!Khmer OS Siemreap" panose="02000500000000020004" pitchFamily="2" charset="0"/>
+                <a:cs typeface="!Khmer OS Siemreap" panose="02000500000000020004" pitchFamily="2" charset="0"/>
+              </a:rPr>
+              <a:t>នៅក្នុង</a:t>
+            </a:r>
+            <a:r>
+              <a:rPr lang="en-US" sz="1400" dirty="0">
+                <a:latin typeface="!Khmer OS Siemreap" panose="02000500000000020004" pitchFamily="2" charset="0"/>
+                <a:cs typeface="!Khmer OS Siemreap" panose="02000500000000020004" pitchFamily="2" charset="0"/>
+              </a:rPr>
+              <a:t> LAN </a:t>
+            </a:r>
+            <a:r>
+              <a:rPr lang="km-KH" sz="1400" dirty="0">
+                <a:latin typeface="!Khmer OS Siemreap" panose="02000500000000020004" pitchFamily="2" charset="0"/>
+                <a:cs typeface="!Khmer OS Siemreap" panose="02000500000000020004" pitchFamily="2" charset="0"/>
+              </a:rPr>
+              <a:t>ដែលពេលនោះនឹងកើតមាន</a:t>
+            </a:r>
+            <a:r>
+              <a:rPr lang="en-US" sz="1400" dirty="0">
+                <a:latin typeface="!Khmer OS Siemreap" panose="02000500000000020004" pitchFamily="2" charset="0"/>
+                <a:cs typeface="!Khmer OS Siemreap" panose="02000500000000020004" pitchFamily="2" charset="0"/>
+              </a:rPr>
+              <a:t> Man-in-the-Middle Attack </a:t>
+            </a:r>
+            <a:r>
+              <a:rPr lang="km-KH" sz="1400" dirty="0">
+                <a:latin typeface="!Khmer OS Siemreap" panose="02000500000000020004" pitchFamily="2" charset="0"/>
+                <a:cs typeface="!Khmer OS Siemreap" panose="02000500000000020004" pitchFamily="2" charset="0"/>
+              </a:rPr>
+              <a:t>ជាដើម។</a:t>
+            </a:r>
+            <a:endParaRPr lang="en-US" sz="1400" dirty="0">
+              <a:latin typeface="!Khmer OS Siemreap" panose="02000500000000020004" pitchFamily="2" charset="0"/>
+              <a:cs typeface="!Khmer OS Siemreap" panose="02000500000000020004" pitchFamily="2" charset="0"/>
+            </a:endParaRPr>
+          </a:p>
           <a:p>
             <a:pPr marL="285750" indent="-285750">
               <a:lnSpc>
@@ -5053,223 +5603,10 @@
               <a:buFont typeface="Wingdings" panose="05000000000000000000" pitchFamily="2" charset="2"/>
               <a:buChar char="Ø"/>
             </a:pPr>
-            <a:r>
-              <a:rPr lang="en-US" sz="1400" dirty="0">
-                <a:latin typeface="!Khmer OS Siemreap" panose="02000500000000020004" pitchFamily="2" charset="0"/>
-                <a:cs typeface="!Khmer OS Siemreap" panose="02000500000000020004" pitchFamily="2" charset="0"/>
-              </a:rPr>
-              <a:t>Ports </a:t>
-            </a:r>
-            <a:r>
-              <a:rPr lang="km-KH" sz="1400" dirty="0">
-                <a:latin typeface="!Khmer OS Siemreap" panose="02000500000000020004" pitchFamily="2" charset="0"/>
-                <a:cs typeface="!Khmer OS Siemreap" panose="02000500000000020004" pitchFamily="2" charset="0"/>
-              </a:rPr>
-              <a:t>របស់ </a:t>
-            </a:r>
-            <a:r>
-              <a:rPr lang="en-US" sz="1400" dirty="0">
-                <a:latin typeface="!Khmer OS Siemreap" panose="02000500000000020004" pitchFamily="2" charset="0"/>
-                <a:cs typeface="!Khmer OS Siemreap" panose="02000500000000020004" pitchFamily="2" charset="0"/>
-              </a:rPr>
-              <a:t>Switch </a:t>
-            </a:r>
-            <a:r>
-              <a:rPr lang="km-KH" sz="1400" dirty="0">
-                <a:latin typeface="!Khmer OS Siemreap" panose="02000500000000020004" pitchFamily="2" charset="0"/>
-                <a:cs typeface="!Khmer OS Siemreap" panose="02000500000000020004" pitchFamily="2" charset="0"/>
-              </a:rPr>
-              <a:t>ដែលមិនបានប្រើប្រាស់មិនត្រូវបានបិទ</a:t>
-            </a:r>
-            <a:r>
-              <a:rPr lang="en-US" sz="1400" dirty="0">
-                <a:latin typeface="!Khmer OS Siemreap" panose="02000500000000020004" pitchFamily="2" charset="0"/>
-                <a:cs typeface="!Khmer OS Siemreap" panose="02000500000000020004" pitchFamily="2" charset="0"/>
-              </a:rPr>
-              <a:t> (Shutdown)</a:t>
-            </a:r>
-            <a:r>
-              <a:rPr lang="km-KH" sz="1400" dirty="0">
-                <a:latin typeface="!Khmer OS Siemreap" panose="02000500000000020004" pitchFamily="2" charset="0"/>
-                <a:cs typeface="!Khmer OS Siemreap" panose="02000500000000020004" pitchFamily="2" charset="0"/>
-              </a:rPr>
-              <a:t>​ និងស្ថិតនៅ</a:t>
-            </a:r>
-            <a:r>
-              <a:rPr lang="en-US" sz="1400" dirty="0">
-                <a:latin typeface="!Khmer OS Siemreap" panose="02000500000000020004" pitchFamily="2" charset="0"/>
-                <a:cs typeface="!Khmer OS Siemreap" panose="02000500000000020004" pitchFamily="2" charset="0"/>
-              </a:rPr>
-              <a:t> mode </a:t>
-            </a:r>
-            <a:r>
-              <a:rPr lang="km-KH" sz="1400" dirty="0">
-                <a:latin typeface="!Khmer OS Siemreap" panose="02000500000000020004" pitchFamily="2" charset="0"/>
-                <a:cs typeface="!Khmer OS Siemreap" panose="02000500000000020004" pitchFamily="2" charset="0"/>
-              </a:rPr>
-              <a:t>(</a:t>
-            </a:r>
-            <a:r>
-              <a:rPr lang="en-US" sz="1400" dirty="0">
-                <a:latin typeface="!Khmer OS Siemreap" panose="02000500000000020004" pitchFamily="2" charset="0"/>
-                <a:cs typeface="!Khmer OS Siemreap" panose="02000500000000020004" pitchFamily="2" charset="0"/>
-              </a:rPr>
-              <a:t>Dynamic Auto</a:t>
-            </a:r>
-            <a:r>
-              <a:rPr lang="km-KH" sz="1400" dirty="0">
-                <a:latin typeface="!Khmer OS Siemreap" panose="02000500000000020004" pitchFamily="2" charset="0"/>
-                <a:cs typeface="!Khmer OS Siemreap" panose="02000500000000020004" pitchFamily="2" charset="0"/>
-              </a:rPr>
-              <a:t>)</a:t>
-            </a:r>
-            <a:r>
-              <a:rPr lang="en-US" sz="1400" dirty="0">
-                <a:latin typeface="!Khmer OS Siemreap" panose="02000500000000020004" pitchFamily="2" charset="0"/>
-                <a:cs typeface="!Khmer OS Siemreap" panose="02000500000000020004" pitchFamily="2" charset="0"/>
-              </a:rPr>
-              <a:t> </a:t>
-            </a:r>
-            <a:r>
-              <a:rPr lang="km-KH" sz="1400" dirty="0">
-                <a:latin typeface="!Khmer OS Siemreap" panose="02000500000000020004" pitchFamily="2" charset="0"/>
-                <a:cs typeface="!Khmer OS Siemreap" panose="02000500000000020004" pitchFamily="2" charset="0"/>
-              </a:rPr>
-              <a:t>ដែលធ្វើអោយប្រឈមនឹង</a:t>
-            </a:r>
-            <a:r>
-              <a:rPr lang="en-US" sz="1400" dirty="0">
-                <a:latin typeface="!Khmer OS Siemreap" panose="02000500000000020004" pitchFamily="2" charset="0"/>
-                <a:cs typeface="!Khmer OS Siemreap" panose="02000500000000020004" pitchFamily="2" charset="0"/>
-              </a:rPr>
-              <a:t> VLAN Hopping </a:t>
-            </a:r>
-            <a:r>
-              <a:rPr lang="km-KH" sz="1400" dirty="0">
-                <a:latin typeface="!Khmer OS Siemreap" panose="02000500000000020004" pitchFamily="2" charset="0"/>
-                <a:cs typeface="!Khmer OS Siemreap" panose="02000500000000020004" pitchFamily="2" charset="0"/>
-              </a:rPr>
-              <a:t>ដែលអ្នកប្រើប្រាស់មានបំណងអាក្រក់អាចក្លែងបន្លំ</a:t>
-            </a:r>
-            <a:r>
-              <a:rPr lang="en-US" sz="1400" dirty="0">
-                <a:latin typeface="!Khmer OS Siemreap" panose="02000500000000020004" pitchFamily="2" charset="0"/>
-                <a:cs typeface="!Khmer OS Siemreap" panose="02000500000000020004" pitchFamily="2" charset="0"/>
-              </a:rPr>
-              <a:t> Device </a:t>
-            </a:r>
-            <a:r>
-              <a:rPr lang="km-KH" sz="1400" dirty="0">
-                <a:latin typeface="!Khmer OS Siemreap" panose="02000500000000020004" pitchFamily="2" charset="0"/>
-                <a:cs typeface="!Khmer OS Siemreap" panose="02000500000000020004" pitchFamily="2" charset="0"/>
-              </a:rPr>
-              <a:t>របស់ខ្លួនជា </a:t>
-            </a:r>
-            <a:r>
-              <a:rPr lang="en-US" sz="1400" dirty="0">
-                <a:latin typeface="!Khmer OS Siemreap" panose="02000500000000020004" pitchFamily="2" charset="0"/>
-                <a:cs typeface="!Khmer OS Siemreap" panose="02000500000000020004" pitchFamily="2" charset="0"/>
-              </a:rPr>
-              <a:t>Switch </a:t>
-            </a:r>
-            <a:r>
-              <a:rPr lang="km-KH" sz="1400" dirty="0">
-                <a:latin typeface="!Khmer OS Siemreap" panose="02000500000000020004" pitchFamily="2" charset="0"/>
-                <a:cs typeface="!Khmer OS Siemreap" panose="02000500000000020004" pitchFamily="2" charset="0"/>
-              </a:rPr>
-              <a:t>និង​ធ្វើ </a:t>
-            </a:r>
-            <a:r>
-              <a:rPr lang="en-US" sz="1400" dirty="0">
-                <a:latin typeface="!Khmer OS Siemreap" panose="02000500000000020004" pitchFamily="2" charset="0"/>
-                <a:cs typeface="!Khmer OS Siemreap" panose="02000500000000020004" pitchFamily="2" charset="0"/>
-              </a:rPr>
-              <a:t>Negotiation </a:t>
-            </a:r>
-            <a:r>
-              <a:rPr lang="km-KH" sz="1400" dirty="0">
-                <a:latin typeface="!Khmer OS Siemreap" panose="02000500000000020004" pitchFamily="2" charset="0"/>
-                <a:cs typeface="!Khmer OS Siemreap" panose="02000500000000020004" pitchFamily="2" charset="0"/>
-              </a:rPr>
-              <a:t>ដើម្បីបង្កើត </a:t>
-            </a:r>
-            <a:r>
-              <a:rPr lang="en-US" sz="1400" dirty="0">
-                <a:latin typeface="!Khmer OS Siemreap" panose="02000500000000020004" pitchFamily="2" charset="0"/>
-                <a:cs typeface="!Khmer OS Siemreap" panose="02000500000000020004" pitchFamily="2" charset="0"/>
-              </a:rPr>
-              <a:t>Trunk Link</a:t>
-            </a:r>
-            <a:r>
-              <a:rPr lang="km-KH" sz="1400" dirty="0">
-                <a:latin typeface="!Khmer OS Siemreap" panose="02000500000000020004" pitchFamily="2" charset="0"/>
-                <a:cs typeface="!Khmer OS Siemreap" panose="02000500000000020004" pitchFamily="2" charset="0"/>
-              </a:rPr>
-              <a:t>។ ពេលនោះ</a:t>
-            </a:r>
-            <a:r>
-              <a:rPr lang="en-US" sz="1400" dirty="0">
-                <a:latin typeface="!Khmer OS Siemreap" panose="02000500000000020004" pitchFamily="2" charset="0"/>
-                <a:cs typeface="!Khmer OS Siemreap" panose="02000500000000020004" pitchFamily="2" charset="0"/>
-              </a:rPr>
-              <a:t> Device </a:t>
-            </a:r>
-            <a:r>
-              <a:rPr lang="km-KH" sz="1400" dirty="0">
-                <a:latin typeface="!Khmer OS Siemreap" panose="02000500000000020004" pitchFamily="2" charset="0"/>
-                <a:cs typeface="!Khmer OS Siemreap" panose="02000500000000020004" pitchFamily="2" charset="0"/>
-              </a:rPr>
-              <a:t>របស់ជនមានបំណងអាក្រក់អាច </a:t>
-            </a:r>
-            <a:r>
-              <a:rPr lang="en-US" sz="1400" dirty="0">
-                <a:latin typeface="!Khmer OS Siemreap" panose="02000500000000020004" pitchFamily="2" charset="0"/>
-                <a:cs typeface="!Khmer OS Siemreap" panose="02000500000000020004" pitchFamily="2" charset="0"/>
-              </a:rPr>
-              <a:t>Access </a:t>
-            </a:r>
-            <a:r>
-              <a:rPr lang="km-KH" sz="1400" dirty="0">
-                <a:latin typeface="!Khmer OS Siemreap" panose="02000500000000020004" pitchFamily="2" charset="0"/>
-                <a:cs typeface="!Khmer OS Siemreap" panose="02000500000000020004" pitchFamily="2" charset="0"/>
-              </a:rPr>
-              <a:t>ទៅគ្រប់ </a:t>
-            </a:r>
-            <a:r>
-              <a:rPr lang="en-US" sz="1400" dirty="0">
-                <a:latin typeface="!Khmer OS Siemreap" panose="02000500000000020004" pitchFamily="2" charset="0"/>
-                <a:cs typeface="!Khmer OS Siemreap" panose="02000500000000020004" pitchFamily="2" charset="0"/>
-              </a:rPr>
-              <a:t>Devices </a:t>
-            </a:r>
-            <a:r>
-              <a:rPr lang="km-KH" sz="1400" dirty="0">
-                <a:latin typeface="!Khmer OS Siemreap" panose="02000500000000020004" pitchFamily="2" charset="0"/>
-                <a:cs typeface="!Khmer OS Siemreap" panose="02000500000000020004" pitchFamily="2" charset="0"/>
-              </a:rPr>
-              <a:t>ផ្សេងទៀតទោះស្ថិតក្នុង</a:t>
-            </a:r>
-            <a:r>
-              <a:rPr lang="en-US" sz="1400" dirty="0">
-                <a:latin typeface="!Khmer OS Siemreap" panose="02000500000000020004" pitchFamily="2" charset="0"/>
-                <a:cs typeface="!Khmer OS Siemreap" panose="02000500000000020004" pitchFamily="2" charset="0"/>
-              </a:rPr>
-              <a:t> VLAN </a:t>
-            </a:r>
-            <a:r>
-              <a:rPr lang="km-KH" sz="1400" dirty="0">
-                <a:latin typeface="!Khmer OS Siemreap" panose="02000500000000020004" pitchFamily="2" charset="0"/>
-                <a:cs typeface="!Khmer OS Siemreap" panose="02000500000000020004" pitchFamily="2" charset="0"/>
-              </a:rPr>
-              <a:t>ផ្សេងក៏ដោយ។</a:t>
-            </a:r>
-            <a:r>
-              <a:rPr lang="en-US" sz="1400" dirty="0">
-                <a:latin typeface="!Khmer OS Siemreap" panose="02000500000000020004" pitchFamily="2" charset="0"/>
-                <a:cs typeface="!Khmer OS Siemreap" panose="02000500000000020004" pitchFamily="2" charset="0"/>
-              </a:rPr>
-              <a:t> </a:t>
-            </a:r>
+            <a:endParaRPr lang="en-US" sz="1400" dirty="0">
+              <a:latin typeface="!Khmer OS Siemreap" panose="02000500000000020004" pitchFamily="2" charset="0"/>
+              <a:cs typeface="!Khmer OS Siemreap" panose="02000500000000020004" pitchFamily="2" charset="0"/>
+            </a:endParaRPr>
           </a:p>
         </p:txBody>
       </p:sp>
@@ -5277,6 +5614,489 @@
     <p:extLst>
       <p:ext uri="{BB962C8B-B14F-4D97-AF65-F5344CB8AC3E}">
         <p14:creationId xmlns:p14="http://schemas.microsoft.com/office/powerpoint/2010/main" val="3567576842"/>
+      </p:ext>
+    </p:extLst>
+  </p:cSld>
+  <p:clrMapOvr>
+    <a:masterClrMapping/>
+  </p:clrMapOvr>
+</p:sld>
+</file>
+
+<file path=ppt/slides/slide8.xml><?xml version="1.0" encoding="utf-8"?>
+<p:sld xmlns:a="http://schemas.openxmlformats.org/drawingml/2006/main" xmlns:r="http://schemas.openxmlformats.org/officeDocument/2006/relationships" xmlns:p="http://schemas.openxmlformats.org/presentationml/2006/main">
+  <p:cSld>
+    <p:spTree>
+      <p:nvGrpSpPr>
+        <p:cNvPr id="1" name=""/>
+        <p:cNvGrpSpPr/>
+        <p:nvPr/>
+      </p:nvGrpSpPr>
+      <p:grpSpPr>
+        <a:xfrm>
+          <a:off x="0" y="0"/>
+          <a:ext cx="0" cy="0"/>
+          <a:chOff x="0" y="0"/>
+          <a:chExt cx="0" cy="0"/>
+        </a:xfrm>
+      </p:grpSpPr>
+      <p:sp>
+        <p:nvSpPr>
+          <p:cNvPr id="2" name="TextBox 1">
+            <a:extLst>
+              <a:ext uri="{FF2B5EF4-FFF2-40B4-BE49-F238E27FC236}">
+                <a16:creationId xmlns:a16="http://schemas.microsoft.com/office/drawing/2014/main" id="{A74D110C-E4BE-73BB-EAF0-6624D638CA7B}"/>
+              </a:ext>
+            </a:extLst>
+          </p:cNvPr>
+          <p:cNvSpPr txBox="1"/>
+          <p:nvPr/>
+        </p:nvSpPr>
+        <p:spPr>
+          <a:xfrm>
+            <a:off x="907080" y="1197405"/>
+            <a:ext cx="6413610" cy="3620222"/>
+          </a:xfrm>
+          <a:prstGeom prst="rect">
+            <a:avLst/>
+          </a:prstGeom>
+          <a:noFill/>
+        </p:spPr>
+        <p:txBody>
+          <a:bodyPr wrap="square">
+            <a:spAutoFit/>
+          </a:bodyPr>
+          <a:lstStyle/>
+          <a:p>
+            <a:pPr marL="742950" lvl="1" indent="-285750">
+              <a:lnSpc>
+                <a:spcPct val="150000"/>
+              </a:lnSpc>
+              <a:buFont typeface="Wingdings" panose="05000000000000000000" pitchFamily="2" charset="2"/>
+              <a:buChar char="Ø"/>
+            </a:pPr>
+            <a:r>
+              <a:rPr lang="en-US" sz="1400" dirty="0">
+                <a:latin typeface="!Khmer OS Siemreap" panose="02000500000000020004" pitchFamily="2" charset="0"/>
+                <a:cs typeface="!Khmer OS Siemreap" panose="02000500000000020004" pitchFamily="2" charset="0"/>
+              </a:rPr>
+              <a:t>Switch</a:t>
+            </a:r>
+            <a:r>
+              <a:rPr lang="km-KH" sz="1400" dirty="0">
+                <a:latin typeface="!Khmer OS Siemreap" panose="02000500000000020004" pitchFamily="2" charset="0"/>
+                <a:cs typeface="!Khmer OS Siemreap" panose="02000500000000020004" pitchFamily="2" charset="0"/>
+              </a:rPr>
+              <a:t>​ មិនមាន</a:t>
+            </a:r>
+            <a:r>
+              <a:rPr lang="en-US" sz="1400" dirty="0">
+                <a:latin typeface="!Khmer OS Siemreap" panose="02000500000000020004" pitchFamily="2" charset="0"/>
+                <a:cs typeface="!Khmer OS Siemreap" panose="02000500000000020004" pitchFamily="2" charset="0"/>
+              </a:rPr>
+              <a:t> Configuration </a:t>
+            </a:r>
+            <a:r>
+              <a:rPr lang="km-KH" sz="1400" dirty="0">
+                <a:latin typeface="!Khmer OS Siemreap" panose="02000500000000020004" pitchFamily="2" charset="0"/>
+                <a:cs typeface="!Khmer OS Siemreap" panose="02000500000000020004" pitchFamily="2" charset="0"/>
+              </a:rPr>
+              <a:t>ទាក់ទងនឹង </a:t>
+            </a:r>
+            <a:r>
+              <a:rPr lang="en-US" sz="1400" dirty="0" err="1">
+                <a:latin typeface="!Khmer OS Siemreap" panose="02000500000000020004" pitchFamily="2" charset="0"/>
+                <a:cs typeface="!Khmer OS Siemreap" panose="02000500000000020004" pitchFamily="2" charset="0"/>
+              </a:rPr>
+              <a:t>PortFast</a:t>
+            </a:r>
+            <a:r>
+              <a:rPr lang="en-US" sz="1400" dirty="0">
+                <a:latin typeface="!Khmer OS Siemreap" panose="02000500000000020004" pitchFamily="2" charset="0"/>
+                <a:cs typeface="!Khmer OS Siemreap" panose="02000500000000020004" pitchFamily="2" charset="0"/>
+              </a:rPr>
+              <a:t> </a:t>
+            </a:r>
+            <a:r>
+              <a:rPr lang="km-KH" sz="1400" dirty="0">
+                <a:latin typeface="!Khmer OS Siemreap" panose="02000500000000020004" pitchFamily="2" charset="0"/>
+                <a:cs typeface="!Khmer OS Siemreap" panose="02000500000000020004" pitchFamily="2" charset="0"/>
+              </a:rPr>
+              <a:t>និង </a:t>
+            </a:r>
+            <a:r>
+              <a:rPr lang="en-US" sz="1400" dirty="0">
+                <a:latin typeface="!Khmer OS Siemreap" panose="02000500000000020004" pitchFamily="2" charset="0"/>
+                <a:cs typeface="!Khmer OS Siemreap" panose="02000500000000020004" pitchFamily="2" charset="0"/>
+              </a:rPr>
+              <a:t>BPDU Guard </a:t>
+            </a:r>
+            <a:r>
+              <a:rPr lang="km-KH" sz="1400" dirty="0">
+                <a:latin typeface="!Khmer OS Siemreap" panose="02000500000000020004" pitchFamily="2" charset="0"/>
+                <a:cs typeface="!Khmer OS Siemreap" panose="02000500000000020004" pitchFamily="2" charset="0"/>
+              </a:rPr>
+              <a:t>ដែល</a:t>
+            </a:r>
+            <a:r>
+              <a:rPr lang="en-US" sz="1400" dirty="0">
+                <a:latin typeface="!Khmer OS Siemreap" panose="02000500000000020004" pitchFamily="2" charset="0"/>
+                <a:cs typeface="!Khmer OS Siemreap" panose="02000500000000020004" pitchFamily="2" charset="0"/>
+              </a:rPr>
+              <a:t> Attacker </a:t>
+            </a:r>
+            <a:r>
+              <a:rPr lang="km-KH" sz="1400" dirty="0">
+                <a:latin typeface="!Khmer OS Siemreap" panose="02000500000000020004" pitchFamily="2" charset="0"/>
+                <a:cs typeface="!Khmer OS Siemreap" panose="02000500000000020004" pitchFamily="2" charset="0"/>
+              </a:rPr>
+              <a:t>អាចធ្វើ</a:t>
+            </a:r>
+            <a:r>
+              <a:rPr lang="en-US" sz="1400" dirty="0">
+                <a:latin typeface="!Khmer OS Siemreap" panose="02000500000000020004" pitchFamily="2" charset="0"/>
+                <a:cs typeface="!Khmer OS Siemreap" panose="02000500000000020004" pitchFamily="2" charset="0"/>
+              </a:rPr>
+              <a:t> STP Attacks</a:t>
+            </a:r>
+            <a:r>
+              <a:rPr lang="km-KH" sz="1400" dirty="0">
+                <a:latin typeface="!Khmer OS Siemreap" panose="02000500000000020004" pitchFamily="2" charset="0"/>
+                <a:cs typeface="!Khmer OS Siemreap" panose="02000500000000020004" pitchFamily="2" charset="0"/>
+              </a:rPr>
+              <a:t>​ ធ្វើអោយមាន​កំណែប្រែ </a:t>
+            </a:r>
+            <a:r>
+              <a:rPr lang="en-US" sz="1400" dirty="0">
+                <a:latin typeface="!Khmer OS Siemreap" panose="02000500000000020004" pitchFamily="2" charset="0"/>
+                <a:cs typeface="!Khmer OS Siemreap" panose="02000500000000020004" pitchFamily="2" charset="0"/>
+              </a:rPr>
+              <a:t>Topology </a:t>
+            </a:r>
+            <a:r>
+              <a:rPr lang="km-KH" sz="1400" dirty="0">
+                <a:latin typeface="!Khmer OS Siemreap" panose="02000500000000020004" pitchFamily="2" charset="0"/>
+                <a:cs typeface="!Khmer OS Siemreap" panose="02000500000000020004" pitchFamily="2" charset="0"/>
+              </a:rPr>
+              <a:t>ដោយ​</a:t>
+            </a:r>
+            <a:r>
+              <a:rPr lang="en-US" sz="1400" dirty="0">
+                <a:latin typeface="!Khmer OS Siemreap" panose="02000500000000020004" pitchFamily="2" charset="0"/>
+                <a:cs typeface="!Khmer OS Siemreap" panose="02000500000000020004" pitchFamily="2" charset="0"/>
+              </a:rPr>
+              <a:t> Device </a:t>
+            </a:r>
+            <a:r>
+              <a:rPr lang="km-KH" sz="1400" dirty="0">
+                <a:latin typeface="!Khmer OS Siemreap" panose="02000500000000020004" pitchFamily="2" charset="0"/>
+                <a:cs typeface="!Khmer OS Siemreap" panose="02000500000000020004" pitchFamily="2" charset="0"/>
+              </a:rPr>
+              <a:t>របស់ </a:t>
+            </a:r>
+            <a:r>
+              <a:rPr lang="en-US" sz="1400" dirty="0">
+                <a:latin typeface="!Khmer OS Siemreap" panose="02000500000000020004" pitchFamily="2" charset="0"/>
+                <a:cs typeface="!Khmer OS Siemreap" panose="02000500000000020004" pitchFamily="2" charset="0"/>
+              </a:rPr>
+              <a:t>Attacker </a:t>
+            </a:r>
+            <a:r>
+              <a:rPr lang="km-KH" sz="1400" dirty="0">
+                <a:latin typeface="!Khmer OS Siemreap" panose="02000500000000020004" pitchFamily="2" charset="0"/>
+                <a:cs typeface="!Khmer OS Siemreap" panose="02000500000000020004" pitchFamily="2" charset="0"/>
+              </a:rPr>
+              <a:t>ជា</a:t>
+            </a:r>
+            <a:r>
+              <a:rPr lang="en-US" sz="1400" dirty="0">
+                <a:latin typeface="!Khmer OS Siemreap" panose="02000500000000020004" pitchFamily="2" charset="0"/>
+                <a:cs typeface="!Khmer OS Siemreap" panose="02000500000000020004" pitchFamily="2" charset="0"/>
+              </a:rPr>
+              <a:t> Root Bridge </a:t>
+            </a:r>
+            <a:r>
+              <a:rPr lang="km-KH" sz="1400" dirty="0">
+                <a:latin typeface="!Khmer OS Siemreap" panose="02000500000000020004" pitchFamily="2" charset="0"/>
+                <a:cs typeface="!Khmer OS Siemreap" panose="02000500000000020004" pitchFamily="2" charset="0"/>
+              </a:rPr>
+              <a:t>ហើយមាន</a:t>
+            </a:r>
+            <a:r>
+              <a:rPr lang="en-US" sz="1400" dirty="0">
+                <a:latin typeface="!Khmer OS Siemreap" panose="02000500000000020004" pitchFamily="2" charset="0"/>
+                <a:cs typeface="!Khmer OS Siemreap" panose="02000500000000020004" pitchFamily="2" charset="0"/>
+              </a:rPr>
+              <a:t> Man-in-the-Middle Attack </a:t>
+            </a:r>
+            <a:r>
+              <a:rPr lang="km-KH" sz="1400" dirty="0">
+                <a:latin typeface="!Khmer OS Siemreap" panose="02000500000000020004" pitchFamily="2" charset="0"/>
+                <a:cs typeface="!Khmer OS Siemreap" panose="02000500000000020004" pitchFamily="2" charset="0"/>
+              </a:rPr>
+              <a:t>ជាដើម។</a:t>
+            </a:r>
+            <a:endParaRPr lang="en-US" sz="1400" dirty="0">
+              <a:latin typeface="!Khmer OS Siemreap" panose="02000500000000020004" pitchFamily="2" charset="0"/>
+              <a:cs typeface="!Khmer OS Siemreap" panose="02000500000000020004" pitchFamily="2" charset="0"/>
+            </a:endParaRPr>
+          </a:p>
+          <a:p>
+            <a:pPr marL="742950" lvl="1" indent="-285750">
+              <a:lnSpc>
+                <a:spcPct val="150000"/>
+              </a:lnSpc>
+              <a:buFont typeface="Wingdings" panose="05000000000000000000" pitchFamily="2" charset="2"/>
+              <a:buChar char="q"/>
+            </a:pPr>
+            <a:r>
+              <a:rPr lang="km-KH" sz="1400" dirty="0">
+                <a:latin typeface="!Khmer OS Siemreap" panose="02000500000000020004" pitchFamily="2" charset="0"/>
+                <a:cs typeface="!Khmer OS Siemreap" panose="02000500000000020004" pitchFamily="2" charset="0"/>
+              </a:rPr>
+              <a:t>ផ្នែក </a:t>
+            </a:r>
+            <a:r>
+              <a:rPr lang="en-US" sz="1400" dirty="0">
+                <a:latin typeface="!Khmer OS Siemreap" panose="02000500000000020004" pitchFamily="2" charset="0"/>
+                <a:cs typeface="!Khmer OS Siemreap" panose="02000500000000020004" pitchFamily="2" charset="0"/>
+              </a:rPr>
+              <a:t>Switching </a:t>
+            </a:r>
+          </a:p>
+          <a:p>
+            <a:pPr marL="1200150" lvl="2" indent="-285750">
+              <a:lnSpc>
+                <a:spcPct val="150000"/>
+              </a:lnSpc>
+              <a:buFont typeface="Wingdings" panose="05000000000000000000" pitchFamily="2" charset="2"/>
+              <a:buChar char="Ø"/>
+            </a:pPr>
+            <a:r>
+              <a:rPr lang="en-US" sz="1400" dirty="0">
+                <a:latin typeface="!Khmer OS Siemreap" panose="02000500000000020004" pitchFamily="2" charset="0"/>
+                <a:cs typeface="!Khmer OS Siemreap" panose="02000500000000020004" pitchFamily="2" charset="0"/>
+              </a:rPr>
+              <a:t>Switch </a:t>
+            </a:r>
+            <a:r>
+              <a:rPr lang="km-KH" sz="1400" dirty="0">
+                <a:latin typeface="!Khmer OS Siemreap" panose="02000500000000020004" pitchFamily="2" charset="0"/>
+                <a:cs typeface="!Khmer OS Siemreap" panose="02000500000000020004" pitchFamily="2" charset="0"/>
+              </a:rPr>
+              <a:t>មិនមាន</a:t>
+            </a:r>
+            <a:r>
+              <a:rPr lang="en-US" sz="1400" dirty="0">
+                <a:latin typeface="!Khmer OS Siemreap" panose="02000500000000020004" pitchFamily="2" charset="0"/>
+                <a:cs typeface="!Khmer OS Siemreap" panose="02000500000000020004" pitchFamily="2" charset="0"/>
+              </a:rPr>
+              <a:t> Configuration </a:t>
+            </a:r>
+            <a:r>
+              <a:rPr lang="km-KH" sz="1400" dirty="0">
+                <a:latin typeface="!Khmer OS Siemreap" panose="02000500000000020004" pitchFamily="2" charset="0"/>
+                <a:cs typeface="!Khmer OS Siemreap" panose="02000500000000020004" pitchFamily="2" charset="0"/>
+              </a:rPr>
+              <a:t>ទាក់ទងនឹង</a:t>
+            </a:r>
+            <a:r>
+              <a:rPr lang="en-US" sz="1400" dirty="0">
+                <a:latin typeface="!Khmer OS Siemreap" panose="02000500000000020004" pitchFamily="2" charset="0"/>
+                <a:cs typeface="!Khmer OS Siemreap" panose="02000500000000020004" pitchFamily="2" charset="0"/>
+              </a:rPr>
+              <a:t> VLAN </a:t>
+            </a:r>
+            <a:r>
+              <a:rPr lang="km-KH" sz="1400" dirty="0">
+                <a:latin typeface="!Khmer OS Siemreap" panose="02000500000000020004" pitchFamily="2" charset="0"/>
+                <a:cs typeface="!Khmer OS Siemreap" panose="02000500000000020004" pitchFamily="2" charset="0"/>
+              </a:rPr>
+              <a:t>ពោលគឺអ្នកប្រើប្រាស់ទាំងអស់ស្ថិតក្នុង</a:t>
+            </a:r>
+            <a:r>
+              <a:rPr lang="en-US" sz="1400" dirty="0">
+                <a:latin typeface="!Khmer OS Siemreap" panose="02000500000000020004" pitchFamily="2" charset="0"/>
+                <a:cs typeface="!Khmer OS Siemreap" panose="02000500000000020004" pitchFamily="2" charset="0"/>
+              </a:rPr>
+              <a:t> Network </a:t>
+            </a:r>
+            <a:r>
+              <a:rPr lang="km-KH" sz="1400" dirty="0">
+                <a:latin typeface="!Khmer OS Siemreap" panose="02000500000000020004" pitchFamily="2" charset="0"/>
+                <a:cs typeface="!Khmer OS Siemreap" panose="02000500000000020004" pitchFamily="2" charset="0"/>
+              </a:rPr>
+              <a:t>តែមួយដែលពិបាកក្នុងការគ្រប់គ្រង និងជា </a:t>
+            </a:r>
+            <a:r>
+              <a:rPr lang="en-US" sz="1400" dirty="0">
+                <a:latin typeface="!Khmer OS Siemreap" panose="02000500000000020004" pitchFamily="2" charset="0"/>
+                <a:cs typeface="!Khmer OS Siemreap" panose="02000500000000020004" pitchFamily="2" charset="0"/>
+              </a:rPr>
+              <a:t>Single Broadcast Domain </a:t>
+            </a:r>
+            <a:r>
+              <a:rPr lang="km-KH" sz="1400" dirty="0">
+                <a:latin typeface="!Khmer OS Siemreap" panose="02000500000000020004" pitchFamily="2" charset="0"/>
+                <a:cs typeface="!Khmer OS Siemreap" panose="02000500000000020004" pitchFamily="2" charset="0"/>
+              </a:rPr>
+              <a:t>អាចនឹងទទួលផលវិបាកពី</a:t>
+            </a:r>
+            <a:r>
+              <a:rPr lang="en-US" sz="1400" dirty="0">
+                <a:latin typeface="!Khmer OS Siemreap" panose="02000500000000020004" pitchFamily="2" charset="0"/>
+                <a:cs typeface="!Khmer OS Siemreap" panose="02000500000000020004" pitchFamily="2" charset="0"/>
+              </a:rPr>
+              <a:t> Broadcast Storms </a:t>
+            </a:r>
+            <a:r>
+              <a:rPr lang="km-KH" sz="1400" dirty="0">
+                <a:latin typeface="!Khmer OS Siemreap" panose="02000500000000020004" pitchFamily="2" charset="0"/>
+                <a:cs typeface="!Khmer OS Siemreap" panose="02000500000000020004" pitchFamily="2" charset="0"/>
+              </a:rPr>
+              <a:t>ដែលជះឥទ្ធិពលដល់ដំណើរការបណ្ដាញ។</a:t>
+            </a:r>
+            <a:endParaRPr lang="en-US" sz="1400" dirty="0">
+              <a:latin typeface="!Khmer OS Siemreap" panose="02000500000000020004" pitchFamily="2" charset="0"/>
+              <a:cs typeface="!Khmer OS Siemreap" panose="02000500000000020004" pitchFamily="2" charset="0"/>
+            </a:endParaRPr>
+          </a:p>
+          <a:p>
+            <a:pPr lvl="1">
+              <a:lnSpc>
+                <a:spcPct val="150000"/>
+              </a:lnSpc>
+            </a:pPr>
+            <a:endParaRPr lang="en-US" sz="1400" dirty="0">
+              <a:latin typeface="!Khmer OS Siemreap" panose="02000500000000020004" pitchFamily="2" charset="0"/>
+              <a:cs typeface="!Khmer OS Siemreap" panose="02000500000000020004" pitchFamily="2" charset="0"/>
+            </a:endParaRPr>
+          </a:p>
+          <a:p>
+            <a:pPr marL="742950" lvl="1" indent="-285750">
+              <a:lnSpc>
+                <a:spcPct val="150000"/>
+              </a:lnSpc>
+              <a:buFont typeface="Wingdings" panose="05000000000000000000" pitchFamily="2" charset="2"/>
+              <a:buChar char="q"/>
+            </a:pPr>
+            <a:endParaRPr lang="en-US" sz="1400" dirty="0">
+              <a:latin typeface="!Khmer OS Siemreap" panose="02000500000000020004" pitchFamily="2" charset="0"/>
+              <a:cs typeface="!Khmer OS Siemreap" panose="02000500000000020004" pitchFamily="2" charset="0"/>
+            </a:endParaRPr>
+          </a:p>
+        </p:txBody>
+      </p:sp>
+    </p:spTree>
+    <p:extLst>
+      <p:ext uri="{BB962C8B-B14F-4D97-AF65-F5344CB8AC3E}">
+        <p14:creationId xmlns:p14="http://schemas.microsoft.com/office/powerpoint/2010/main" val="1940259264"/>
+      </p:ext>
+    </p:extLst>
+  </p:cSld>
+  <p:clrMapOvr>
+    <a:masterClrMapping/>
+  </p:clrMapOvr>
+</p:sld>
+</file>
+
+<file path=ppt/slides/slide9.xml><?xml version="1.0" encoding="utf-8"?>
+<p:sld xmlns:a="http://schemas.openxmlformats.org/drawingml/2006/main" xmlns:r="http://schemas.openxmlformats.org/officeDocument/2006/relationships" xmlns:p="http://schemas.openxmlformats.org/presentationml/2006/main">
+  <p:cSld>
+    <p:spTree>
+      <p:nvGrpSpPr>
+        <p:cNvPr id="1" name=""/>
+        <p:cNvGrpSpPr/>
+        <p:nvPr/>
+      </p:nvGrpSpPr>
+      <p:grpSpPr>
+        <a:xfrm>
+          <a:off x="0" y="0"/>
+          <a:ext cx="0" cy="0"/>
+          <a:chOff x="0" y="0"/>
+          <a:chExt cx="0" cy="0"/>
+        </a:xfrm>
+      </p:grpSpPr>
+      <p:sp>
+        <p:nvSpPr>
+          <p:cNvPr id="2" name="TextBox 1">
+            <a:extLst>
+              <a:ext uri="{FF2B5EF4-FFF2-40B4-BE49-F238E27FC236}">
+                <a16:creationId xmlns:a16="http://schemas.microsoft.com/office/drawing/2014/main" id="{EDB63553-C6FE-5AE7-CE9E-23601F4DFD99}"/>
+              </a:ext>
+            </a:extLst>
+          </p:cNvPr>
+          <p:cNvSpPr txBox="1"/>
+          <p:nvPr/>
+        </p:nvSpPr>
+        <p:spPr>
+          <a:xfrm>
+            <a:off x="1059785" y="1808225"/>
+            <a:ext cx="6413610" cy="1034899"/>
+          </a:xfrm>
+          <a:prstGeom prst="rect">
+            <a:avLst/>
+          </a:prstGeom>
+          <a:noFill/>
+        </p:spPr>
+        <p:txBody>
+          <a:bodyPr wrap="square">
+            <a:spAutoFit/>
+          </a:bodyPr>
+          <a:lstStyle/>
+          <a:p>
+            <a:pPr marL="285750" indent="-285750">
+              <a:lnSpc>
+                <a:spcPct val="150000"/>
+              </a:lnSpc>
+              <a:buFont typeface="Wingdings" panose="05000000000000000000" pitchFamily="2" charset="2"/>
+              <a:buChar char="Ø"/>
+            </a:pPr>
+            <a:r>
+              <a:rPr lang="en-US" sz="1400" dirty="0">
+                <a:latin typeface="!Khmer OS Siemreap" panose="02000500000000020004" pitchFamily="2" charset="0"/>
+                <a:cs typeface="!Khmer OS Siemreap" panose="02000500000000020004" pitchFamily="2" charset="0"/>
+              </a:rPr>
+              <a:t>In new topology, add a DHCP server linked to a switch and switch linked to router and implement DHCP snooping to prevent DHCP starvation (DoS)</a:t>
+            </a:r>
+            <a:endParaRPr lang="km-KH" sz="1400" dirty="0">
+              <a:latin typeface="!Khmer OS Siemreap" panose="02000500000000020004" pitchFamily="2" charset="0"/>
+              <a:cs typeface="!Khmer OS Siemreap" panose="02000500000000020004" pitchFamily="2" charset="0"/>
+            </a:endParaRPr>
+          </a:p>
+          <a:p>
+            <a:pPr marL="285750" indent="-285750">
+              <a:lnSpc>
+                <a:spcPct val="150000"/>
+              </a:lnSpc>
+              <a:buFont typeface="Wingdings" panose="05000000000000000000" pitchFamily="2" charset="2"/>
+              <a:buChar char="Ø"/>
+            </a:pPr>
+            <a:r>
+              <a:rPr lang="en-US" sz="1400" dirty="0">
+                <a:latin typeface="!Khmer OS Siemreap" panose="02000500000000020004" pitchFamily="2" charset="0"/>
+                <a:cs typeface="!Khmer OS Siemreap" panose="02000500000000020004" pitchFamily="2" charset="0"/>
+              </a:rPr>
+              <a:t>Use </a:t>
+            </a:r>
+            <a:r>
+              <a:rPr lang="en-US" sz="1400">
+                <a:latin typeface="!Khmer OS Siemreap" panose="02000500000000020004" pitchFamily="2" charset="0"/>
+                <a:cs typeface="!Khmer OS Siemreap" panose="02000500000000020004" pitchFamily="2" charset="0"/>
+              </a:rPr>
+              <a:t>Etherchannel</a:t>
+            </a:r>
+            <a:endParaRPr lang="en-US" sz="1400" dirty="0">
+              <a:latin typeface="!Khmer OS Siemreap" panose="02000500000000020004" pitchFamily="2" charset="0"/>
+              <a:cs typeface="!Khmer OS Siemreap" panose="02000500000000020004" pitchFamily="2" charset="0"/>
+            </a:endParaRPr>
+          </a:p>
+        </p:txBody>
+      </p:sp>
+    </p:spTree>
+    <p:extLst>
+      <p:ext uri="{BB962C8B-B14F-4D97-AF65-F5344CB8AC3E}">
+        <p14:creationId xmlns:p14="http://schemas.microsoft.com/office/powerpoint/2010/main" val="4192575716"/>
       </p:ext>
     </p:extLst>
   </p:cSld>

</xml_diff>